<commit_message>
- Changed diagrams to be consistant
</commit_message>
<xml_diff>
--- a/Ryan/Ryan_fsm.pptx
+++ b/Ryan/Ryan_fsm.pptx
@@ -289,7 +289,7 @@
           <a:p>
             <a:fld id="{61E4D331-D615-484E-9A48-0D6A2EECBE2B}" type="datetimeFigureOut">
               <a:rPr lang="en-US" smtClean="0"/>
-              <a:t>16/05/15</a:t>
+              <a:t>5/19/2015</a:t>
             </a:fld>
             <a:endParaRPr lang="en-US"/>
           </a:p>
@@ -459,7 +459,7 @@
           <a:p>
             <a:fld id="{61E4D331-D615-484E-9A48-0D6A2EECBE2B}" type="datetimeFigureOut">
               <a:rPr lang="en-US" smtClean="0"/>
-              <a:t>16/05/15</a:t>
+              <a:t>5/19/2015</a:t>
             </a:fld>
             <a:endParaRPr lang="en-US"/>
           </a:p>
@@ -639,7 +639,7 @@
           <a:p>
             <a:fld id="{61E4D331-D615-484E-9A48-0D6A2EECBE2B}" type="datetimeFigureOut">
               <a:rPr lang="en-US" smtClean="0"/>
-              <a:t>16/05/15</a:t>
+              <a:t>5/19/2015</a:t>
             </a:fld>
             <a:endParaRPr lang="en-US"/>
           </a:p>
@@ -809,7 +809,7 @@
           <a:p>
             <a:fld id="{61E4D331-D615-484E-9A48-0D6A2EECBE2B}" type="datetimeFigureOut">
               <a:rPr lang="en-US" smtClean="0"/>
-              <a:t>16/05/15</a:t>
+              <a:t>5/19/2015</a:t>
             </a:fld>
             <a:endParaRPr lang="en-US"/>
           </a:p>
@@ -1055,7 +1055,7 @@
           <a:p>
             <a:fld id="{61E4D331-D615-484E-9A48-0D6A2EECBE2B}" type="datetimeFigureOut">
               <a:rPr lang="en-US" smtClean="0"/>
-              <a:t>16/05/15</a:t>
+              <a:t>5/19/2015</a:t>
             </a:fld>
             <a:endParaRPr lang="en-US"/>
           </a:p>
@@ -1343,7 +1343,7 @@
           <a:p>
             <a:fld id="{61E4D331-D615-484E-9A48-0D6A2EECBE2B}" type="datetimeFigureOut">
               <a:rPr lang="en-US" smtClean="0"/>
-              <a:t>16/05/15</a:t>
+              <a:t>5/19/2015</a:t>
             </a:fld>
             <a:endParaRPr lang="en-US"/>
           </a:p>
@@ -1765,7 +1765,7 @@
           <a:p>
             <a:fld id="{61E4D331-D615-484E-9A48-0D6A2EECBE2B}" type="datetimeFigureOut">
               <a:rPr lang="en-US" smtClean="0"/>
-              <a:t>16/05/15</a:t>
+              <a:t>5/19/2015</a:t>
             </a:fld>
             <a:endParaRPr lang="en-US"/>
           </a:p>
@@ -1883,7 +1883,7 @@
           <a:p>
             <a:fld id="{61E4D331-D615-484E-9A48-0D6A2EECBE2B}" type="datetimeFigureOut">
               <a:rPr lang="en-US" smtClean="0"/>
-              <a:t>16/05/15</a:t>
+              <a:t>5/19/2015</a:t>
             </a:fld>
             <a:endParaRPr lang="en-US"/>
           </a:p>
@@ -1978,7 +1978,7 @@
           <a:p>
             <a:fld id="{61E4D331-D615-484E-9A48-0D6A2EECBE2B}" type="datetimeFigureOut">
               <a:rPr lang="en-US" smtClean="0"/>
-              <a:t>16/05/15</a:t>
+              <a:t>5/19/2015</a:t>
             </a:fld>
             <a:endParaRPr lang="en-US"/>
           </a:p>
@@ -2255,7 +2255,7 @@
           <a:p>
             <a:fld id="{61E4D331-D615-484E-9A48-0D6A2EECBE2B}" type="datetimeFigureOut">
               <a:rPr lang="en-US" smtClean="0"/>
-              <a:t>16/05/15</a:t>
+              <a:t>5/19/2015</a:t>
             </a:fld>
             <a:endParaRPr lang="en-US"/>
           </a:p>
@@ -2508,7 +2508,7 @@
           <a:p>
             <a:fld id="{61E4D331-D615-484E-9A48-0D6A2EECBE2B}" type="datetimeFigureOut">
               <a:rPr lang="en-US" smtClean="0"/>
-              <a:t>16/05/15</a:t>
+              <a:t>5/19/2015</a:t>
             </a:fld>
             <a:endParaRPr lang="en-US"/>
           </a:p>
@@ -2721,7 +2721,7 @@
           <a:p>
             <a:fld id="{61E4D331-D615-484E-9A48-0D6A2EECBE2B}" type="datetimeFigureOut">
               <a:rPr lang="en-US" smtClean="0"/>
-              <a:t>16/05/15</a:t>
+              <a:t>5/19/2015</a:t>
             </a:fld>
             <a:endParaRPr lang="en-US"/>
           </a:p>
@@ -3096,1150 +3096,990 @@
           <a:chExt cx="0" cy="0"/>
         </a:xfrm>
       </p:grpSpPr>
-      <p:sp>
-        <p:nvSpPr>
-          <p:cNvPr id="4" name="TextBox 3"/>
-          <p:cNvSpPr txBox="1"/>
+      <p:grpSp>
+        <p:nvGrpSpPr>
+          <p:cNvPr id="2" name="Group 1"/>
+          <p:cNvGrpSpPr/>
           <p:nvPr/>
-        </p:nvSpPr>
-        <p:spPr>
+        </p:nvGrpSpPr>
+        <p:grpSpPr>
           <a:xfrm>
-            <a:off x="3237514" y="359993"/>
-            <a:ext cx="2300630" cy="400110"/>
+            <a:off x="1534065" y="359993"/>
+            <a:ext cx="5134266" cy="6242064"/>
+            <a:chOff x="1534065" y="359993"/>
+            <a:chExt cx="5134266" cy="6242064"/>
           </a:xfrm>
-          <a:prstGeom prst="rect">
-            <a:avLst/>
-          </a:prstGeom>
-        </p:spPr>
-        <p:style>
-          <a:lnRef idx="2">
-            <a:schemeClr val="dk1"/>
-          </a:lnRef>
-          <a:fillRef idx="1">
-            <a:schemeClr val="lt1"/>
-          </a:fillRef>
-          <a:effectRef idx="0">
-            <a:schemeClr val="dk1"/>
-          </a:effectRef>
-          <a:fontRef idx="minor">
-            <a:schemeClr val="dk1"/>
-          </a:fontRef>
-        </p:style>
-        <p:txBody>
-          <a:bodyPr wrap="none" rtlCol="0">
-            <a:spAutoFit/>
-          </a:bodyPr>
-          <a:lstStyle/>
-          <a:p>
-            <a:r>
-              <a:rPr lang="en-US" sz="1200" dirty="0" smtClean="0"/>
-              <a:t>Start state</a:t>
-            </a:r>
-          </a:p>
-          <a:p>
-            <a:pPr marL="171450" indent="-171450">
-              <a:buFont typeface="Arial"/>
-              <a:buChar char="•"/>
-            </a:pPr>
-            <a:r>
-              <a:rPr lang="en-US" sz="800" dirty="0" smtClean="0"/>
-              <a:t>Determine home colour and other base colour</a:t>
-            </a:r>
-            <a:endParaRPr lang="en-US" sz="800" dirty="0"/>
-          </a:p>
-        </p:txBody>
-      </p:sp>
-      <p:sp>
-        <p:nvSpPr>
-          <p:cNvPr id="5" name="TextBox 4"/>
-          <p:cNvSpPr txBox="1"/>
-          <p:nvPr/>
-        </p:nvSpPr>
-        <p:spPr>
-          <a:xfrm>
-            <a:off x="3641471" y="1328118"/>
-            <a:ext cx="1492716" cy="646331"/>
-          </a:xfrm>
-          <a:prstGeom prst="rect">
-            <a:avLst/>
-          </a:prstGeom>
-        </p:spPr>
-        <p:style>
-          <a:lnRef idx="2">
-            <a:schemeClr val="dk1"/>
-          </a:lnRef>
-          <a:fillRef idx="1">
-            <a:schemeClr val="lt1"/>
-          </a:fillRef>
-          <a:effectRef idx="0">
-            <a:schemeClr val="dk1"/>
-          </a:effectRef>
-          <a:fontRef idx="minor">
-            <a:schemeClr val="dk1"/>
-          </a:fontRef>
-        </p:style>
-        <p:txBody>
-          <a:bodyPr wrap="none" rtlCol="0">
-            <a:spAutoFit/>
-          </a:bodyPr>
-          <a:lstStyle/>
-          <a:p>
-            <a:r>
-              <a:rPr lang="en-US" sz="1200" dirty="0" smtClean="0"/>
-              <a:t>Path finding state</a:t>
-            </a:r>
-          </a:p>
-          <a:p>
-            <a:pPr marL="171450" indent="-171450">
-              <a:buFont typeface="Arial"/>
-              <a:buChar char="•"/>
-            </a:pPr>
-            <a:r>
-              <a:rPr lang="en-US" sz="800" dirty="0" smtClean="0"/>
-              <a:t>Update map</a:t>
-            </a:r>
-          </a:p>
-          <a:p>
-            <a:pPr marL="171450" indent="-171450">
-              <a:buFont typeface="Arial"/>
-              <a:buChar char="•"/>
-            </a:pPr>
-            <a:r>
-              <a:rPr lang="en-US" sz="800" dirty="0" smtClean="0"/>
-              <a:t>Look for weights</a:t>
-            </a:r>
-          </a:p>
-          <a:p>
-            <a:pPr marL="171450" indent="-171450">
-              <a:buFont typeface="Arial"/>
-              <a:buChar char="•"/>
-            </a:pPr>
-            <a:r>
-              <a:rPr lang="en-US" sz="800" dirty="0" smtClean="0"/>
-              <a:t>Decide where to drive next</a:t>
-            </a:r>
-            <a:endParaRPr lang="en-US" sz="800" dirty="0"/>
-          </a:p>
-        </p:txBody>
-      </p:sp>
-      <p:sp>
-        <p:nvSpPr>
-          <p:cNvPr id="6" name="TextBox 5"/>
-          <p:cNvSpPr txBox="1"/>
-          <p:nvPr/>
-        </p:nvSpPr>
-        <p:spPr>
-          <a:xfrm>
-            <a:off x="3577350" y="2590772"/>
-            <a:ext cx="1620957" cy="400110"/>
-          </a:xfrm>
-          <a:prstGeom prst="rect">
-            <a:avLst/>
-          </a:prstGeom>
-        </p:spPr>
-        <p:style>
-          <a:lnRef idx="2">
-            <a:schemeClr val="dk1"/>
-          </a:lnRef>
-          <a:fillRef idx="1">
-            <a:schemeClr val="lt1"/>
-          </a:fillRef>
-          <a:effectRef idx="0">
-            <a:schemeClr val="dk1"/>
-          </a:effectRef>
-          <a:fontRef idx="minor">
-            <a:schemeClr val="dk1"/>
-          </a:fontRef>
-        </p:style>
-        <p:txBody>
-          <a:bodyPr wrap="none" rtlCol="0">
-            <a:spAutoFit/>
-          </a:bodyPr>
-          <a:lstStyle/>
-          <a:p>
-            <a:r>
-              <a:rPr lang="en-US" sz="1200" dirty="0" smtClean="0"/>
-              <a:t>Get weight state</a:t>
-            </a:r>
-          </a:p>
-          <a:p>
-            <a:pPr marL="171450" indent="-171450">
-              <a:buFont typeface="Arial"/>
-              <a:buChar char="•"/>
-            </a:pPr>
-            <a:r>
-              <a:rPr lang="en-US" sz="800" dirty="0" smtClean="0"/>
-              <a:t>Align weight with free magnet </a:t>
-            </a:r>
-            <a:endParaRPr lang="en-US" sz="800" dirty="0"/>
-          </a:p>
-        </p:txBody>
-      </p:sp>
-      <p:sp>
-        <p:nvSpPr>
-          <p:cNvPr id="7" name="TextBox 6"/>
-          <p:cNvSpPr txBox="1"/>
-          <p:nvPr/>
-        </p:nvSpPr>
-        <p:spPr>
-          <a:xfrm>
-            <a:off x="3346518" y="3500975"/>
-            <a:ext cx="2082621" cy="769441"/>
-          </a:xfrm>
-          <a:prstGeom prst="rect">
-            <a:avLst/>
-          </a:prstGeom>
-        </p:spPr>
-        <p:style>
-          <a:lnRef idx="2">
-            <a:schemeClr val="dk1"/>
-          </a:lnRef>
-          <a:fillRef idx="1">
-            <a:schemeClr val="lt1"/>
-          </a:fillRef>
-          <a:effectRef idx="0">
-            <a:schemeClr val="dk1"/>
-          </a:effectRef>
-          <a:fontRef idx="minor">
-            <a:schemeClr val="dk1"/>
-          </a:fontRef>
-        </p:style>
-        <p:txBody>
-          <a:bodyPr wrap="none" rtlCol="0">
-            <a:spAutoFit/>
-          </a:bodyPr>
-          <a:lstStyle/>
-          <a:p>
-            <a:r>
-              <a:rPr lang="en-US" sz="1200" dirty="0" smtClean="0"/>
-              <a:t>Attach weight state</a:t>
-            </a:r>
-          </a:p>
-          <a:p>
-            <a:pPr marL="171450" indent="-171450">
-              <a:buFont typeface="Arial"/>
-              <a:buChar char="•"/>
-            </a:pPr>
-            <a:r>
-              <a:rPr lang="en-US" sz="800" dirty="0" smtClean="0"/>
-              <a:t>Lower magnet assembly</a:t>
-            </a:r>
-          </a:p>
-          <a:p>
-            <a:pPr marL="171450" indent="-171450">
-              <a:buFont typeface="Arial"/>
-              <a:buChar char="•"/>
-            </a:pPr>
-            <a:r>
-              <a:rPr lang="en-US" sz="800" dirty="0" smtClean="0"/>
-              <a:t>Drive into weight </a:t>
-            </a:r>
-          </a:p>
-          <a:p>
-            <a:pPr marL="171450" indent="-171450">
-              <a:buFont typeface="Arial"/>
-              <a:buChar char="•"/>
-            </a:pPr>
-            <a:r>
-              <a:rPr lang="en-US" sz="800" dirty="0" smtClean="0"/>
-              <a:t>Raise magnet assembly</a:t>
-            </a:r>
-          </a:p>
-          <a:p>
-            <a:pPr marL="171450" indent="-171450">
-              <a:buFont typeface="Arial"/>
-              <a:buChar char="•"/>
-            </a:pPr>
-            <a:r>
-              <a:rPr lang="en-US" sz="800" dirty="0" smtClean="0"/>
-              <a:t>Record weight onboard and magnet used</a:t>
-            </a:r>
-            <a:endParaRPr lang="en-US" sz="800" dirty="0"/>
-          </a:p>
-        </p:txBody>
-      </p:sp>
-      <p:sp>
-        <p:nvSpPr>
-          <p:cNvPr id="8" name="TextBox 7"/>
-          <p:cNvSpPr txBox="1"/>
-          <p:nvPr/>
-        </p:nvSpPr>
-        <p:spPr>
-          <a:xfrm>
-            <a:off x="3083626" y="4908466"/>
-            <a:ext cx="2608406" cy="523220"/>
-          </a:xfrm>
-          <a:prstGeom prst="rect">
-            <a:avLst/>
-          </a:prstGeom>
-        </p:spPr>
-        <p:style>
-          <a:lnRef idx="2">
-            <a:schemeClr val="dk1"/>
-          </a:lnRef>
-          <a:fillRef idx="1">
-            <a:schemeClr val="lt1"/>
-          </a:fillRef>
-          <a:effectRef idx="0">
-            <a:schemeClr val="dk1"/>
-          </a:effectRef>
-          <a:fontRef idx="minor">
-            <a:schemeClr val="dk1"/>
-          </a:fontRef>
-        </p:style>
-        <p:txBody>
-          <a:bodyPr wrap="none" rtlCol="0">
-            <a:spAutoFit/>
-          </a:bodyPr>
-          <a:lstStyle/>
-          <a:p>
-            <a:r>
-              <a:rPr lang="en-US" sz="1200" dirty="0" smtClean="0"/>
-              <a:t>Return to home base state</a:t>
-            </a:r>
-          </a:p>
-          <a:p>
-            <a:pPr marL="171450" indent="-171450">
-              <a:buFont typeface="Arial"/>
-              <a:buChar char="•"/>
-            </a:pPr>
-            <a:r>
-              <a:rPr lang="en-US" sz="800" dirty="0" smtClean="0"/>
-              <a:t>Use information provided by path finding to get home</a:t>
-            </a:r>
-          </a:p>
-          <a:p>
-            <a:pPr marL="171450" indent="-171450">
-              <a:buFont typeface="Arial"/>
-              <a:buChar char="•"/>
-            </a:pPr>
-            <a:r>
-              <a:rPr lang="en-US" sz="800" dirty="0" smtClean="0"/>
-              <a:t>Colour detected </a:t>
-            </a:r>
-            <a:endParaRPr lang="en-US" sz="800" dirty="0"/>
-          </a:p>
-        </p:txBody>
-      </p:sp>
-      <p:sp>
-        <p:nvSpPr>
-          <p:cNvPr id="9" name="TextBox 8"/>
-          <p:cNvSpPr txBox="1"/>
-          <p:nvPr/>
-        </p:nvSpPr>
-        <p:spPr>
-          <a:xfrm>
-            <a:off x="3500554" y="5916678"/>
-            <a:ext cx="1800493" cy="646331"/>
-          </a:xfrm>
-          <a:prstGeom prst="rect">
-            <a:avLst/>
-          </a:prstGeom>
-        </p:spPr>
-        <p:style>
-          <a:lnRef idx="2">
-            <a:schemeClr val="dk1"/>
-          </a:lnRef>
-          <a:fillRef idx="1">
-            <a:schemeClr val="lt1"/>
-          </a:fillRef>
-          <a:effectRef idx="0">
-            <a:schemeClr val="dk1"/>
-          </a:effectRef>
-          <a:fontRef idx="minor">
-            <a:schemeClr val="dk1"/>
-          </a:fontRef>
-        </p:style>
-        <p:txBody>
-          <a:bodyPr wrap="none" rtlCol="0">
-            <a:spAutoFit/>
-          </a:bodyPr>
-          <a:lstStyle/>
-          <a:p>
-            <a:r>
-              <a:rPr lang="en-US" sz="1200" dirty="0" smtClean="0"/>
-              <a:t>Dropping of weights state</a:t>
-            </a:r>
-          </a:p>
-          <a:p>
-            <a:pPr marL="171450" indent="-171450">
-              <a:buFont typeface="Arial"/>
-              <a:buChar char="•"/>
-            </a:pPr>
-            <a:r>
-              <a:rPr lang="en-US" sz="800" dirty="0" smtClean="0"/>
-              <a:t>Lower magnet assembly</a:t>
-            </a:r>
-          </a:p>
-          <a:p>
-            <a:pPr marL="171450" indent="-171450">
-              <a:buFont typeface="Arial"/>
-              <a:buChar char="•"/>
-            </a:pPr>
-            <a:r>
-              <a:rPr lang="en-US" sz="800" dirty="0" smtClean="0"/>
-              <a:t>Drive to stepper servos</a:t>
-            </a:r>
-          </a:p>
-          <a:p>
-            <a:pPr marL="171450" indent="-171450">
-              <a:buFont typeface="Arial"/>
-              <a:buChar char="•"/>
-            </a:pPr>
-            <a:r>
-              <a:rPr lang="en-US" sz="800" dirty="0" smtClean="0"/>
-              <a:t>Raise magnet assembly</a:t>
-            </a:r>
-            <a:endParaRPr lang="en-US" sz="800" dirty="0"/>
-          </a:p>
-        </p:txBody>
-      </p:sp>
-      <p:cxnSp>
-        <p:nvCxnSpPr>
-          <p:cNvPr id="11" name="Straight Arrow Connector 10"/>
-          <p:cNvCxnSpPr>
-            <a:stCxn id="4" idx="2"/>
-            <a:endCxn id="5" idx="0"/>
-          </p:cNvCxnSpPr>
-          <p:nvPr/>
-        </p:nvCxnSpPr>
-        <p:spPr>
-          <a:xfrm>
-            <a:off x="4387829" y="760103"/>
-            <a:ext cx="0" cy="568015"/>
-          </a:xfrm>
-          <a:prstGeom prst="straightConnector1">
-            <a:avLst/>
-          </a:prstGeom>
-          <a:ln>
-            <a:tailEnd type="arrow"/>
-          </a:ln>
-        </p:spPr>
-        <p:style>
-          <a:lnRef idx="2">
-            <a:schemeClr val="accent1"/>
-          </a:lnRef>
-          <a:fillRef idx="0">
-            <a:schemeClr val="accent1"/>
-          </a:fillRef>
-          <a:effectRef idx="1">
-            <a:schemeClr val="accent1"/>
-          </a:effectRef>
-          <a:fontRef idx="minor">
-            <a:schemeClr val="tx1"/>
-          </a:fontRef>
-        </p:style>
-      </p:cxnSp>
-      <p:sp>
-        <p:nvSpPr>
-          <p:cNvPr id="15" name="TextBox 14"/>
-          <p:cNvSpPr txBox="1"/>
-          <p:nvPr/>
-        </p:nvSpPr>
-        <p:spPr>
-          <a:xfrm>
-            <a:off x="4347397" y="938066"/>
-            <a:ext cx="1497438" cy="246221"/>
-          </a:xfrm>
-          <a:prstGeom prst="rect">
-            <a:avLst/>
-          </a:prstGeom>
-          <a:noFill/>
-        </p:spPr>
-        <p:txBody>
-          <a:bodyPr wrap="none" rtlCol="0">
-            <a:spAutoFit/>
-          </a:bodyPr>
-          <a:lstStyle/>
-          <a:p>
-            <a:r>
-              <a:rPr lang="en-US" sz="1000" dirty="0" smtClean="0"/>
-              <a:t>Colour of base registered</a:t>
-            </a:r>
-            <a:endParaRPr lang="en-US" sz="1000" dirty="0"/>
-          </a:p>
-        </p:txBody>
-      </p:sp>
-      <p:cxnSp>
-        <p:nvCxnSpPr>
-          <p:cNvPr id="17" name="Straight Arrow Connector 16"/>
-          <p:cNvCxnSpPr>
-            <a:stCxn id="5" idx="2"/>
-            <a:endCxn id="6" idx="0"/>
-          </p:cNvCxnSpPr>
-          <p:nvPr/>
-        </p:nvCxnSpPr>
-        <p:spPr>
-          <a:xfrm>
-            <a:off x="4387829" y="1974449"/>
-            <a:ext cx="0" cy="616323"/>
-          </a:xfrm>
-          <a:prstGeom prst="straightConnector1">
-            <a:avLst/>
-          </a:prstGeom>
-          <a:ln>
-            <a:tailEnd type="arrow"/>
-          </a:ln>
-        </p:spPr>
-        <p:style>
-          <a:lnRef idx="2">
-            <a:schemeClr val="accent1"/>
-          </a:lnRef>
-          <a:fillRef idx="0">
-            <a:schemeClr val="accent1"/>
-          </a:fillRef>
-          <a:effectRef idx="1">
-            <a:schemeClr val="accent1"/>
-          </a:effectRef>
-          <a:fontRef idx="minor">
-            <a:schemeClr val="tx1"/>
-          </a:fontRef>
-        </p:style>
-      </p:cxnSp>
-      <p:cxnSp>
-        <p:nvCxnSpPr>
-          <p:cNvPr id="19" name="Straight Arrow Connector 18"/>
-          <p:cNvCxnSpPr>
-            <a:stCxn id="6" idx="2"/>
-            <a:endCxn id="7" idx="0"/>
-          </p:cNvCxnSpPr>
-          <p:nvPr/>
-        </p:nvCxnSpPr>
-        <p:spPr>
-          <a:xfrm>
-            <a:off x="4387829" y="2990882"/>
-            <a:ext cx="0" cy="510093"/>
-          </a:xfrm>
-          <a:prstGeom prst="straightConnector1">
-            <a:avLst/>
-          </a:prstGeom>
-          <a:ln>
-            <a:tailEnd type="arrow"/>
-          </a:ln>
-        </p:spPr>
-        <p:style>
-          <a:lnRef idx="2">
-            <a:schemeClr val="accent1"/>
-          </a:lnRef>
-          <a:fillRef idx="0">
-            <a:schemeClr val="accent1"/>
-          </a:fillRef>
-          <a:effectRef idx="1">
-            <a:schemeClr val="accent1"/>
-          </a:effectRef>
-          <a:fontRef idx="minor">
-            <a:schemeClr val="tx1"/>
-          </a:fontRef>
-        </p:style>
-      </p:cxnSp>
-      <p:cxnSp>
-        <p:nvCxnSpPr>
-          <p:cNvPr id="21" name="Straight Arrow Connector 20"/>
-          <p:cNvCxnSpPr>
-            <a:stCxn id="7" idx="2"/>
-            <a:endCxn id="8" idx="0"/>
-          </p:cNvCxnSpPr>
-          <p:nvPr/>
-        </p:nvCxnSpPr>
-        <p:spPr>
-          <a:xfrm>
-            <a:off x="4387829" y="4270416"/>
-            <a:ext cx="0" cy="638050"/>
-          </a:xfrm>
-          <a:prstGeom prst="straightConnector1">
-            <a:avLst/>
-          </a:prstGeom>
-          <a:ln>
-            <a:tailEnd type="arrow"/>
-          </a:ln>
-        </p:spPr>
-        <p:style>
-          <a:lnRef idx="2">
-            <a:schemeClr val="accent1"/>
-          </a:lnRef>
-          <a:fillRef idx="0">
-            <a:schemeClr val="accent1"/>
-          </a:fillRef>
-          <a:effectRef idx="1">
-            <a:schemeClr val="accent1"/>
-          </a:effectRef>
-          <a:fontRef idx="minor">
-            <a:schemeClr val="tx1"/>
-          </a:fontRef>
-        </p:style>
-      </p:cxnSp>
-      <p:cxnSp>
-        <p:nvCxnSpPr>
-          <p:cNvPr id="23" name="Straight Arrow Connector 22"/>
-          <p:cNvCxnSpPr>
-            <a:stCxn id="8" idx="2"/>
-            <a:endCxn id="9" idx="0"/>
-          </p:cNvCxnSpPr>
-          <p:nvPr/>
-        </p:nvCxnSpPr>
-        <p:spPr>
-          <a:xfrm>
-            <a:off x="4387829" y="5431686"/>
-            <a:ext cx="12972" cy="484992"/>
-          </a:xfrm>
-          <a:prstGeom prst="straightConnector1">
-            <a:avLst/>
-          </a:prstGeom>
-          <a:ln>
-            <a:tailEnd type="arrow"/>
-          </a:ln>
-        </p:spPr>
-        <p:style>
-          <a:lnRef idx="2">
-            <a:schemeClr val="accent1"/>
-          </a:lnRef>
-          <a:fillRef idx="0">
-            <a:schemeClr val="accent1"/>
-          </a:fillRef>
-          <a:effectRef idx="1">
-            <a:schemeClr val="accent1"/>
-          </a:effectRef>
-          <a:fontRef idx="minor">
-            <a:schemeClr val="tx1"/>
-          </a:fontRef>
-        </p:style>
-      </p:cxnSp>
-      <p:sp>
-        <p:nvSpPr>
-          <p:cNvPr id="37" name="TextBox 36"/>
-          <p:cNvSpPr txBox="1"/>
-          <p:nvPr/>
-        </p:nvSpPr>
-        <p:spPr>
-          <a:xfrm>
-            <a:off x="4387829" y="2187534"/>
-            <a:ext cx="913218" cy="246221"/>
-          </a:xfrm>
-          <a:prstGeom prst="rect">
-            <a:avLst/>
-          </a:prstGeom>
-          <a:noFill/>
-        </p:spPr>
-        <p:txBody>
-          <a:bodyPr wrap="none" rtlCol="0">
-            <a:spAutoFit/>
-          </a:bodyPr>
-          <a:lstStyle/>
-          <a:p>
-            <a:r>
-              <a:rPr lang="en-US" sz="1000" dirty="0" smtClean="0"/>
-              <a:t>Locate weight</a:t>
-            </a:r>
-            <a:endParaRPr lang="en-US" sz="1000" dirty="0"/>
-          </a:p>
-        </p:txBody>
-      </p:sp>
-      <p:sp>
-        <p:nvSpPr>
-          <p:cNvPr id="38" name="TextBox 37"/>
-          <p:cNvSpPr txBox="1"/>
-          <p:nvPr/>
-        </p:nvSpPr>
-        <p:spPr>
-          <a:xfrm>
-            <a:off x="4387829" y="3158744"/>
-            <a:ext cx="1455609" cy="246221"/>
-          </a:xfrm>
-          <a:prstGeom prst="rect">
-            <a:avLst/>
-          </a:prstGeom>
-          <a:noFill/>
-        </p:spPr>
-        <p:txBody>
-          <a:bodyPr wrap="none" rtlCol="0">
-            <a:spAutoFit/>
-          </a:bodyPr>
-          <a:lstStyle/>
-          <a:p>
-            <a:r>
-              <a:rPr lang="en-US" sz="1000" dirty="0" smtClean="0"/>
-              <a:t>Aligned to attach weight</a:t>
-            </a:r>
-            <a:endParaRPr lang="en-US" sz="1000" dirty="0"/>
-          </a:p>
-        </p:txBody>
-      </p:sp>
-      <p:sp>
-        <p:nvSpPr>
-          <p:cNvPr id="39" name="TextBox 38"/>
-          <p:cNvSpPr txBox="1"/>
-          <p:nvPr/>
-        </p:nvSpPr>
-        <p:spPr>
-          <a:xfrm>
-            <a:off x="4341961" y="4503495"/>
-            <a:ext cx="1407582" cy="246221"/>
-          </a:xfrm>
-          <a:prstGeom prst="rect">
-            <a:avLst/>
-          </a:prstGeom>
-          <a:noFill/>
-        </p:spPr>
-        <p:txBody>
-          <a:bodyPr wrap="none" rtlCol="0">
-            <a:spAutoFit/>
-          </a:bodyPr>
-          <a:lstStyle/>
-          <a:p>
-            <a:r>
-              <a:rPr lang="en-US" sz="1000" dirty="0" smtClean="0"/>
-              <a:t>Three weights attached</a:t>
-            </a:r>
-            <a:endParaRPr lang="en-US" sz="1000" dirty="0"/>
-          </a:p>
-        </p:txBody>
-      </p:sp>
-      <p:sp>
-        <p:nvSpPr>
-          <p:cNvPr id="40" name="TextBox 39"/>
-          <p:cNvSpPr txBox="1"/>
-          <p:nvPr/>
-        </p:nvSpPr>
-        <p:spPr>
-          <a:xfrm>
-            <a:off x="4363273" y="5612793"/>
-            <a:ext cx="1535697" cy="246221"/>
-          </a:xfrm>
-          <a:prstGeom prst="rect">
-            <a:avLst/>
-          </a:prstGeom>
-          <a:noFill/>
-        </p:spPr>
-        <p:txBody>
-          <a:bodyPr wrap="none" rtlCol="0">
-            <a:spAutoFit/>
-          </a:bodyPr>
-          <a:lstStyle/>
-          <a:p>
-            <a:r>
-              <a:rPr lang="en-US" sz="1000" dirty="0" smtClean="0"/>
-              <a:t>Colour of base recognized</a:t>
-            </a:r>
-            <a:endParaRPr lang="en-US" sz="1000" dirty="0"/>
-          </a:p>
-        </p:txBody>
-      </p:sp>
-      <p:cxnSp>
-        <p:nvCxnSpPr>
-          <p:cNvPr id="58" name="Elbow Connector 57"/>
-          <p:cNvCxnSpPr>
-            <a:endCxn id="6" idx="1"/>
-          </p:cNvCxnSpPr>
-          <p:nvPr/>
-        </p:nvCxnSpPr>
-        <p:spPr>
-          <a:xfrm rot="10800000">
-            <a:off x="3577351" y="2790828"/>
-            <a:ext cx="823451" cy="367917"/>
-          </a:xfrm>
-          <a:prstGeom prst="bentConnector3">
-            <a:avLst>
-              <a:gd name="adj1" fmla="val 127761"/>
-            </a:avLst>
-          </a:prstGeom>
-          <a:ln>
-            <a:tailEnd type="arrow"/>
-          </a:ln>
-        </p:spPr>
-        <p:style>
-          <a:lnRef idx="2">
-            <a:schemeClr val="accent1"/>
-          </a:lnRef>
-          <a:fillRef idx="0">
-            <a:schemeClr val="accent1"/>
-          </a:fillRef>
-          <a:effectRef idx="1">
-            <a:schemeClr val="accent1"/>
-          </a:effectRef>
-          <a:fontRef idx="minor">
-            <a:schemeClr val="tx1"/>
-          </a:fontRef>
-        </p:style>
-      </p:cxnSp>
-      <p:cxnSp>
-        <p:nvCxnSpPr>
-          <p:cNvPr id="63" name="Elbow Connector 62"/>
-          <p:cNvCxnSpPr>
-            <a:stCxn id="7" idx="1"/>
-            <a:endCxn id="5" idx="1"/>
-          </p:cNvCxnSpPr>
-          <p:nvPr/>
-        </p:nvCxnSpPr>
-        <p:spPr>
-          <a:xfrm rot="10800000" flipH="1">
-            <a:off x="3346517" y="1651284"/>
-            <a:ext cx="294953" cy="2234412"/>
-          </a:xfrm>
-          <a:prstGeom prst="bentConnector3">
-            <a:avLst>
-              <a:gd name="adj1" fmla="val -441576"/>
-            </a:avLst>
-          </a:prstGeom>
-          <a:ln>
-            <a:tailEnd type="arrow"/>
-          </a:ln>
-        </p:spPr>
-        <p:style>
-          <a:lnRef idx="2">
-            <a:schemeClr val="accent1"/>
-          </a:lnRef>
-          <a:fillRef idx="0">
-            <a:schemeClr val="accent1"/>
-          </a:fillRef>
-          <a:effectRef idx="1">
-            <a:schemeClr val="accent1"/>
-          </a:effectRef>
-          <a:fontRef idx="minor">
-            <a:schemeClr val="tx1"/>
-          </a:fontRef>
-        </p:style>
-      </p:cxnSp>
-      <p:cxnSp>
-        <p:nvCxnSpPr>
-          <p:cNvPr id="69" name="Elbow Connector 68"/>
-          <p:cNvCxnSpPr>
-            <a:stCxn id="9" idx="3"/>
-            <a:endCxn id="5" idx="3"/>
-          </p:cNvCxnSpPr>
-          <p:nvPr/>
-        </p:nvCxnSpPr>
-        <p:spPr>
-          <a:xfrm flipH="1" flipV="1">
-            <a:off x="5134187" y="1651284"/>
-            <a:ext cx="166860" cy="4588560"/>
-          </a:xfrm>
-          <a:prstGeom prst="bentConnector3">
-            <a:avLst>
-              <a:gd name="adj1" fmla="val -830925"/>
-            </a:avLst>
-          </a:prstGeom>
-          <a:ln>
-            <a:tailEnd type="arrow"/>
-          </a:ln>
-        </p:spPr>
-        <p:style>
-          <a:lnRef idx="2">
-            <a:schemeClr val="accent1"/>
-          </a:lnRef>
-          <a:fillRef idx="0">
-            <a:schemeClr val="accent1"/>
-          </a:fillRef>
-          <a:effectRef idx="1">
-            <a:schemeClr val="accent1"/>
-          </a:effectRef>
-          <a:fontRef idx="minor">
-            <a:schemeClr val="tx1"/>
-          </a:fontRef>
-        </p:style>
-      </p:cxnSp>
-      <p:cxnSp>
-        <p:nvCxnSpPr>
-          <p:cNvPr id="77" name="Elbow Connector 76"/>
-          <p:cNvCxnSpPr>
-            <a:stCxn id="5" idx="2"/>
-            <a:endCxn id="5" idx="1"/>
-          </p:cNvCxnSpPr>
-          <p:nvPr/>
-        </p:nvCxnSpPr>
-        <p:spPr>
-          <a:xfrm rot="5400000" flipH="1">
-            <a:off x="3853067" y="1439688"/>
-            <a:ext cx="323165" cy="746358"/>
-          </a:xfrm>
-          <a:prstGeom prst="bentConnector4">
-            <a:avLst>
-              <a:gd name="adj1" fmla="val -70738"/>
-              <a:gd name="adj2" fmla="val 130629"/>
-            </a:avLst>
-          </a:prstGeom>
-          <a:ln>
-            <a:tailEnd type="arrow"/>
-          </a:ln>
-        </p:spPr>
-        <p:style>
-          <a:lnRef idx="2">
-            <a:schemeClr val="accent1"/>
-          </a:lnRef>
-          <a:fillRef idx="0">
-            <a:schemeClr val="accent1"/>
-          </a:fillRef>
-          <a:effectRef idx="1">
-            <a:schemeClr val="accent1"/>
-          </a:effectRef>
-          <a:fontRef idx="minor">
-            <a:schemeClr val="tx1"/>
-          </a:fontRef>
-        </p:style>
-      </p:cxnSp>
-      <p:sp>
-        <p:nvSpPr>
-          <p:cNvPr id="79" name="TextBox 78"/>
-          <p:cNvSpPr txBox="1"/>
-          <p:nvPr/>
-        </p:nvSpPr>
-        <p:spPr>
-          <a:xfrm>
-            <a:off x="2273684" y="1846204"/>
-            <a:ext cx="1135510" cy="246221"/>
-          </a:xfrm>
-          <a:prstGeom prst="rect">
-            <a:avLst/>
-          </a:prstGeom>
-          <a:noFill/>
-        </p:spPr>
-        <p:txBody>
-          <a:bodyPr wrap="none" rtlCol="0">
-            <a:spAutoFit/>
-          </a:bodyPr>
-          <a:lstStyle/>
-          <a:p>
-            <a:r>
-              <a:rPr lang="en-US" sz="1000" dirty="0" smtClean="0"/>
-              <a:t>No weight located</a:t>
-            </a:r>
-            <a:endParaRPr lang="en-US" sz="1000" dirty="0"/>
-          </a:p>
-        </p:txBody>
-      </p:sp>
-      <p:sp>
-        <p:nvSpPr>
-          <p:cNvPr id="80" name="TextBox 79"/>
-          <p:cNvSpPr txBox="1"/>
-          <p:nvPr/>
-        </p:nvSpPr>
-        <p:spPr>
-          <a:xfrm>
-            <a:off x="2404919" y="3158744"/>
-            <a:ext cx="1665189" cy="246221"/>
-          </a:xfrm>
-          <a:prstGeom prst="rect">
-            <a:avLst/>
-          </a:prstGeom>
-          <a:noFill/>
-        </p:spPr>
-        <p:txBody>
-          <a:bodyPr wrap="none" rtlCol="0">
-            <a:spAutoFit/>
-          </a:bodyPr>
-          <a:lstStyle/>
-          <a:p>
-            <a:r>
-              <a:rPr lang="en-US" sz="1000" dirty="0" smtClean="0"/>
-              <a:t>Not aligned to attach weight</a:t>
-            </a:r>
-            <a:endParaRPr lang="en-US" sz="1000" dirty="0"/>
-          </a:p>
-        </p:txBody>
-      </p:sp>
-      <p:sp>
-        <p:nvSpPr>
-          <p:cNvPr id="82" name="TextBox 81"/>
-          <p:cNvSpPr txBox="1"/>
-          <p:nvPr/>
-        </p:nvSpPr>
-        <p:spPr>
-          <a:xfrm>
-            <a:off x="1534065" y="3885697"/>
-            <a:ext cx="1703449" cy="400110"/>
-          </a:xfrm>
-          <a:prstGeom prst="rect">
-            <a:avLst/>
-          </a:prstGeom>
-          <a:noFill/>
-        </p:spPr>
-        <p:txBody>
-          <a:bodyPr wrap="none" rtlCol="0">
-            <a:spAutoFit/>
-          </a:bodyPr>
-          <a:lstStyle/>
-          <a:p>
-            <a:r>
-              <a:rPr lang="en-US" sz="1000" dirty="0" smtClean="0"/>
-              <a:t>Less then 3 weights on board</a:t>
-            </a:r>
-          </a:p>
-          <a:p>
-            <a:r>
-              <a:rPr lang="en-US" sz="1000" dirty="0" smtClean="0"/>
-              <a:t>OR weight was not picked up</a:t>
-            </a:r>
-            <a:endParaRPr lang="en-US" sz="1000" dirty="0"/>
-          </a:p>
-        </p:txBody>
-      </p:sp>
-      <p:cxnSp>
-        <p:nvCxnSpPr>
-          <p:cNvPr id="84" name="Elbow Connector 83"/>
-          <p:cNvCxnSpPr>
-            <a:stCxn id="8" idx="2"/>
-            <a:endCxn id="8" idx="1"/>
-          </p:cNvCxnSpPr>
-          <p:nvPr/>
-        </p:nvCxnSpPr>
-        <p:spPr>
-          <a:xfrm rot="5400000" flipH="1">
-            <a:off x="3604923" y="4648780"/>
-            <a:ext cx="261610" cy="1304203"/>
-          </a:xfrm>
-          <a:prstGeom prst="bentConnector4">
-            <a:avLst>
-              <a:gd name="adj1" fmla="val -87382"/>
-              <a:gd name="adj2" fmla="val 117528"/>
-            </a:avLst>
-          </a:prstGeom>
-          <a:ln>
-            <a:tailEnd type="arrow"/>
-          </a:ln>
-        </p:spPr>
-        <p:style>
-          <a:lnRef idx="2">
-            <a:schemeClr val="accent1"/>
-          </a:lnRef>
-          <a:fillRef idx="0">
-            <a:schemeClr val="accent1"/>
-          </a:fillRef>
-          <a:effectRef idx="1">
-            <a:schemeClr val="accent1"/>
-          </a:effectRef>
-          <a:fontRef idx="minor">
-            <a:schemeClr val="tx1"/>
-          </a:fontRef>
-        </p:style>
-      </p:cxnSp>
-      <p:sp>
-        <p:nvSpPr>
-          <p:cNvPr id="86" name="TextBox 85"/>
-          <p:cNvSpPr txBox="1"/>
-          <p:nvPr/>
-        </p:nvSpPr>
-        <p:spPr>
-          <a:xfrm>
-            <a:off x="2488795" y="5654001"/>
-            <a:ext cx="1742647" cy="246221"/>
-          </a:xfrm>
-          <a:prstGeom prst="rect">
-            <a:avLst/>
-          </a:prstGeom>
-          <a:noFill/>
-        </p:spPr>
-        <p:txBody>
-          <a:bodyPr wrap="none" rtlCol="0">
-            <a:spAutoFit/>
-          </a:bodyPr>
-          <a:lstStyle/>
-          <a:p>
-            <a:r>
-              <a:rPr lang="en-US" sz="1000" dirty="0" smtClean="0"/>
-              <a:t>Colour of base not recognized</a:t>
-            </a:r>
-            <a:endParaRPr lang="en-US" sz="1000" dirty="0"/>
-          </a:p>
-        </p:txBody>
-      </p:sp>
-      <p:sp>
-        <p:nvSpPr>
-          <p:cNvPr id="87" name="TextBox 86"/>
-          <p:cNvSpPr txBox="1"/>
-          <p:nvPr/>
-        </p:nvSpPr>
-        <p:spPr>
-          <a:xfrm>
-            <a:off x="5538144" y="6232726"/>
-            <a:ext cx="1130187" cy="246221"/>
-          </a:xfrm>
-          <a:prstGeom prst="rect">
-            <a:avLst/>
-          </a:prstGeom>
-          <a:noFill/>
-        </p:spPr>
-        <p:txBody>
-          <a:bodyPr wrap="none" rtlCol="0">
-            <a:spAutoFit/>
-          </a:bodyPr>
-          <a:lstStyle/>
-          <a:p>
-            <a:r>
-              <a:rPr lang="en-US" sz="1000" dirty="0" smtClean="0"/>
-              <a:t>Weights detached</a:t>
-            </a:r>
-            <a:endParaRPr lang="en-US" sz="1000" dirty="0"/>
-          </a:p>
-        </p:txBody>
-      </p:sp>
-      <p:cxnSp>
-        <p:nvCxnSpPr>
-          <p:cNvPr id="89" name="Elbow Connector 88"/>
-          <p:cNvCxnSpPr>
-            <a:stCxn id="9" idx="2"/>
-            <a:endCxn id="9" idx="1"/>
-          </p:cNvCxnSpPr>
-          <p:nvPr/>
-        </p:nvCxnSpPr>
-        <p:spPr>
-          <a:xfrm rot="5400000" flipH="1">
-            <a:off x="3789095" y="5951304"/>
-            <a:ext cx="323165" cy="900247"/>
-          </a:xfrm>
-          <a:prstGeom prst="bentConnector4">
-            <a:avLst>
-              <a:gd name="adj1" fmla="val -47620"/>
-              <a:gd name="adj2" fmla="val 125393"/>
-            </a:avLst>
-          </a:prstGeom>
-          <a:ln>
-            <a:tailEnd type="arrow"/>
-          </a:ln>
-        </p:spPr>
-        <p:style>
-          <a:lnRef idx="2">
-            <a:schemeClr val="accent1"/>
-          </a:lnRef>
-          <a:fillRef idx="0">
-            <a:schemeClr val="accent1"/>
-          </a:fillRef>
-          <a:effectRef idx="1">
-            <a:schemeClr val="accent1"/>
-          </a:effectRef>
-          <a:fontRef idx="minor">
-            <a:schemeClr val="tx1"/>
-          </a:fontRef>
-        </p:style>
-      </p:cxnSp>
-      <p:sp>
-        <p:nvSpPr>
-          <p:cNvPr id="92" name="TextBox 91"/>
-          <p:cNvSpPr txBox="1"/>
-          <p:nvPr/>
-        </p:nvSpPr>
-        <p:spPr>
-          <a:xfrm>
-            <a:off x="1629870" y="6355836"/>
-            <a:ext cx="1607644" cy="246221"/>
-          </a:xfrm>
-          <a:prstGeom prst="rect">
-            <a:avLst/>
-          </a:prstGeom>
-          <a:noFill/>
-        </p:spPr>
-        <p:txBody>
-          <a:bodyPr wrap="none" rtlCol="0">
-            <a:spAutoFit/>
-          </a:bodyPr>
-          <a:lstStyle/>
-          <a:p>
-            <a:r>
-              <a:rPr lang="en-US" sz="1000" dirty="0" smtClean="0"/>
-              <a:t>Some weights still attached</a:t>
-            </a:r>
-            <a:endParaRPr lang="en-US" sz="1000" dirty="0"/>
-          </a:p>
-        </p:txBody>
-      </p:sp>
+        </p:grpSpPr>
+        <p:sp>
+          <p:nvSpPr>
+            <p:cNvPr id="4" name="TextBox 3"/>
+            <p:cNvSpPr txBox="1"/>
+            <p:nvPr/>
+          </p:nvSpPr>
+          <p:spPr>
+            <a:xfrm>
+              <a:off x="3237514" y="359993"/>
+              <a:ext cx="2300630" cy="400110"/>
+            </a:xfrm>
+            <a:prstGeom prst="rect">
+              <a:avLst/>
+            </a:prstGeom>
+            <a:solidFill>
+              <a:schemeClr val="bg1">
+                <a:lumMod val="95000"/>
+              </a:schemeClr>
+            </a:solidFill>
+          </p:spPr>
+          <p:style>
+            <a:lnRef idx="2">
+              <a:schemeClr val="dk1"/>
+            </a:lnRef>
+            <a:fillRef idx="1">
+              <a:schemeClr val="lt1"/>
+            </a:fillRef>
+            <a:effectRef idx="0">
+              <a:schemeClr val="dk1"/>
+            </a:effectRef>
+            <a:fontRef idx="minor">
+              <a:schemeClr val="dk1"/>
+            </a:fontRef>
+          </p:style>
+          <p:txBody>
+            <a:bodyPr wrap="none" rtlCol="0">
+              <a:spAutoFit/>
+            </a:bodyPr>
+            <a:lstStyle/>
+            <a:p>
+              <a:r>
+                <a:rPr lang="en-US" sz="1200" dirty="0" smtClean="0"/>
+                <a:t>Start state</a:t>
+              </a:r>
+            </a:p>
+            <a:p>
+              <a:pPr marL="171450" indent="-171450">
+                <a:buFont typeface="Arial"/>
+                <a:buChar char="•"/>
+              </a:pPr>
+              <a:r>
+                <a:rPr lang="en-US" sz="800" dirty="0" smtClean="0"/>
+                <a:t>Determine home colour and other base colour</a:t>
+              </a:r>
+              <a:endParaRPr lang="en-US" sz="800" dirty="0"/>
+            </a:p>
+          </p:txBody>
+        </p:sp>
+        <p:sp>
+          <p:nvSpPr>
+            <p:cNvPr id="5" name="TextBox 4"/>
+            <p:cNvSpPr txBox="1"/>
+            <p:nvPr/>
+          </p:nvSpPr>
+          <p:spPr>
+            <a:xfrm>
+              <a:off x="3641471" y="1328118"/>
+              <a:ext cx="1492716" cy="646331"/>
+            </a:xfrm>
+            <a:prstGeom prst="rect">
+              <a:avLst/>
+            </a:prstGeom>
+            <a:solidFill>
+              <a:schemeClr val="bg1">
+                <a:lumMod val="95000"/>
+              </a:schemeClr>
+            </a:solidFill>
+          </p:spPr>
+          <p:style>
+            <a:lnRef idx="2">
+              <a:schemeClr val="dk1"/>
+            </a:lnRef>
+            <a:fillRef idx="1">
+              <a:schemeClr val="lt1"/>
+            </a:fillRef>
+            <a:effectRef idx="0">
+              <a:schemeClr val="dk1"/>
+            </a:effectRef>
+            <a:fontRef idx="minor">
+              <a:schemeClr val="dk1"/>
+            </a:fontRef>
+          </p:style>
+          <p:txBody>
+            <a:bodyPr wrap="none" rtlCol="0">
+              <a:spAutoFit/>
+            </a:bodyPr>
+            <a:lstStyle/>
+            <a:p>
+              <a:r>
+                <a:rPr lang="en-US" sz="1200" dirty="0" smtClean="0"/>
+                <a:t>Path finding state</a:t>
+              </a:r>
+            </a:p>
+            <a:p>
+              <a:pPr marL="171450" indent="-171450">
+                <a:buFont typeface="Arial"/>
+                <a:buChar char="•"/>
+              </a:pPr>
+              <a:r>
+                <a:rPr lang="en-US" sz="800" dirty="0" smtClean="0"/>
+                <a:t>Update map</a:t>
+              </a:r>
+            </a:p>
+            <a:p>
+              <a:pPr marL="171450" indent="-171450">
+                <a:buFont typeface="Arial"/>
+                <a:buChar char="•"/>
+              </a:pPr>
+              <a:r>
+                <a:rPr lang="en-US" sz="800" dirty="0" smtClean="0"/>
+                <a:t>Look for weights</a:t>
+              </a:r>
+            </a:p>
+            <a:p>
+              <a:pPr marL="171450" indent="-171450">
+                <a:buFont typeface="Arial"/>
+                <a:buChar char="•"/>
+              </a:pPr>
+              <a:r>
+                <a:rPr lang="en-US" sz="800" dirty="0" smtClean="0"/>
+                <a:t>Decide where to drive next</a:t>
+              </a:r>
+              <a:endParaRPr lang="en-US" sz="800" dirty="0"/>
+            </a:p>
+          </p:txBody>
+        </p:sp>
+        <p:sp>
+          <p:nvSpPr>
+            <p:cNvPr id="6" name="TextBox 5"/>
+            <p:cNvSpPr txBox="1"/>
+            <p:nvPr/>
+          </p:nvSpPr>
+          <p:spPr>
+            <a:xfrm>
+              <a:off x="3577350" y="2590772"/>
+              <a:ext cx="1620957" cy="400110"/>
+            </a:xfrm>
+            <a:prstGeom prst="rect">
+              <a:avLst/>
+            </a:prstGeom>
+            <a:solidFill>
+              <a:schemeClr val="bg1">
+                <a:lumMod val="95000"/>
+              </a:schemeClr>
+            </a:solidFill>
+          </p:spPr>
+          <p:style>
+            <a:lnRef idx="2">
+              <a:schemeClr val="dk1"/>
+            </a:lnRef>
+            <a:fillRef idx="1">
+              <a:schemeClr val="lt1"/>
+            </a:fillRef>
+            <a:effectRef idx="0">
+              <a:schemeClr val="dk1"/>
+            </a:effectRef>
+            <a:fontRef idx="minor">
+              <a:schemeClr val="dk1"/>
+            </a:fontRef>
+          </p:style>
+          <p:txBody>
+            <a:bodyPr wrap="none" rtlCol="0">
+              <a:spAutoFit/>
+            </a:bodyPr>
+            <a:lstStyle/>
+            <a:p>
+              <a:r>
+                <a:rPr lang="en-US" sz="1200" dirty="0" smtClean="0"/>
+                <a:t>Get weight state</a:t>
+              </a:r>
+            </a:p>
+            <a:p>
+              <a:pPr marL="171450" indent="-171450">
+                <a:buFont typeface="Arial"/>
+                <a:buChar char="•"/>
+              </a:pPr>
+              <a:r>
+                <a:rPr lang="en-US" sz="800" dirty="0" smtClean="0"/>
+                <a:t>Align weight with free magnet </a:t>
+              </a:r>
+              <a:endParaRPr lang="en-US" sz="800" dirty="0"/>
+            </a:p>
+          </p:txBody>
+        </p:sp>
+        <p:sp>
+          <p:nvSpPr>
+            <p:cNvPr id="7" name="TextBox 6"/>
+            <p:cNvSpPr txBox="1"/>
+            <p:nvPr/>
+          </p:nvSpPr>
+          <p:spPr>
+            <a:xfrm>
+              <a:off x="3346518" y="3500975"/>
+              <a:ext cx="2082621" cy="769441"/>
+            </a:xfrm>
+            <a:prstGeom prst="rect">
+              <a:avLst/>
+            </a:prstGeom>
+            <a:solidFill>
+              <a:schemeClr val="bg1">
+                <a:lumMod val="95000"/>
+              </a:schemeClr>
+            </a:solidFill>
+          </p:spPr>
+          <p:style>
+            <a:lnRef idx="2">
+              <a:schemeClr val="dk1"/>
+            </a:lnRef>
+            <a:fillRef idx="1">
+              <a:schemeClr val="lt1"/>
+            </a:fillRef>
+            <a:effectRef idx="0">
+              <a:schemeClr val="dk1"/>
+            </a:effectRef>
+            <a:fontRef idx="minor">
+              <a:schemeClr val="dk1"/>
+            </a:fontRef>
+          </p:style>
+          <p:txBody>
+            <a:bodyPr wrap="none" rtlCol="0">
+              <a:spAutoFit/>
+            </a:bodyPr>
+            <a:lstStyle/>
+            <a:p>
+              <a:r>
+                <a:rPr lang="en-US" sz="1200" dirty="0" smtClean="0"/>
+                <a:t>Attach weight state</a:t>
+              </a:r>
+            </a:p>
+            <a:p>
+              <a:pPr marL="171450" indent="-171450">
+                <a:buFont typeface="Arial"/>
+                <a:buChar char="•"/>
+              </a:pPr>
+              <a:r>
+                <a:rPr lang="en-US" sz="800" dirty="0" smtClean="0"/>
+                <a:t>Lower magnet assembly</a:t>
+              </a:r>
+            </a:p>
+            <a:p>
+              <a:pPr marL="171450" indent="-171450">
+                <a:buFont typeface="Arial"/>
+                <a:buChar char="•"/>
+              </a:pPr>
+              <a:r>
+                <a:rPr lang="en-US" sz="800" dirty="0" smtClean="0"/>
+                <a:t>Drive into weight </a:t>
+              </a:r>
+            </a:p>
+            <a:p>
+              <a:pPr marL="171450" indent="-171450">
+                <a:buFont typeface="Arial"/>
+                <a:buChar char="•"/>
+              </a:pPr>
+              <a:r>
+                <a:rPr lang="en-US" sz="800" dirty="0" smtClean="0"/>
+                <a:t>Raise magnet assembly</a:t>
+              </a:r>
+            </a:p>
+            <a:p>
+              <a:pPr marL="171450" indent="-171450">
+                <a:buFont typeface="Arial"/>
+                <a:buChar char="•"/>
+              </a:pPr>
+              <a:r>
+                <a:rPr lang="en-US" sz="800" dirty="0" smtClean="0"/>
+                <a:t>Record weight onboard and magnet used</a:t>
+              </a:r>
+              <a:endParaRPr lang="en-US" sz="800" dirty="0"/>
+            </a:p>
+          </p:txBody>
+        </p:sp>
+        <p:sp>
+          <p:nvSpPr>
+            <p:cNvPr id="8" name="TextBox 7"/>
+            <p:cNvSpPr txBox="1"/>
+            <p:nvPr/>
+          </p:nvSpPr>
+          <p:spPr>
+            <a:xfrm>
+              <a:off x="3083626" y="4908466"/>
+              <a:ext cx="2608406" cy="523220"/>
+            </a:xfrm>
+            <a:prstGeom prst="rect">
+              <a:avLst/>
+            </a:prstGeom>
+            <a:solidFill>
+              <a:schemeClr val="bg1">
+                <a:lumMod val="95000"/>
+              </a:schemeClr>
+            </a:solidFill>
+          </p:spPr>
+          <p:style>
+            <a:lnRef idx="2">
+              <a:schemeClr val="dk1"/>
+            </a:lnRef>
+            <a:fillRef idx="1">
+              <a:schemeClr val="lt1"/>
+            </a:fillRef>
+            <a:effectRef idx="0">
+              <a:schemeClr val="dk1"/>
+            </a:effectRef>
+            <a:fontRef idx="minor">
+              <a:schemeClr val="dk1"/>
+            </a:fontRef>
+          </p:style>
+          <p:txBody>
+            <a:bodyPr wrap="none" rtlCol="0">
+              <a:spAutoFit/>
+            </a:bodyPr>
+            <a:lstStyle/>
+            <a:p>
+              <a:r>
+                <a:rPr lang="en-US" sz="1200" dirty="0" smtClean="0"/>
+                <a:t>Return to home base state</a:t>
+              </a:r>
+            </a:p>
+            <a:p>
+              <a:pPr marL="171450" indent="-171450">
+                <a:buFont typeface="Arial"/>
+                <a:buChar char="•"/>
+              </a:pPr>
+              <a:r>
+                <a:rPr lang="en-US" sz="800" dirty="0" smtClean="0"/>
+                <a:t>Use information provided by path finding to get home</a:t>
+              </a:r>
+            </a:p>
+            <a:p>
+              <a:pPr marL="171450" indent="-171450">
+                <a:buFont typeface="Arial"/>
+                <a:buChar char="•"/>
+              </a:pPr>
+              <a:r>
+                <a:rPr lang="en-US" sz="800" dirty="0" smtClean="0"/>
+                <a:t>Colour detected </a:t>
+              </a:r>
+              <a:endParaRPr lang="en-US" sz="800" dirty="0"/>
+            </a:p>
+          </p:txBody>
+        </p:sp>
+        <p:sp>
+          <p:nvSpPr>
+            <p:cNvPr id="9" name="TextBox 8"/>
+            <p:cNvSpPr txBox="1"/>
+            <p:nvPr/>
+          </p:nvSpPr>
+          <p:spPr>
+            <a:xfrm>
+              <a:off x="3500554" y="5916678"/>
+              <a:ext cx="1800493" cy="646331"/>
+            </a:xfrm>
+            <a:prstGeom prst="rect">
+              <a:avLst/>
+            </a:prstGeom>
+            <a:solidFill>
+              <a:schemeClr val="bg1">
+                <a:lumMod val="95000"/>
+              </a:schemeClr>
+            </a:solidFill>
+          </p:spPr>
+          <p:style>
+            <a:lnRef idx="2">
+              <a:schemeClr val="dk1"/>
+            </a:lnRef>
+            <a:fillRef idx="1">
+              <a:schemeClr val="lt1"/>
+            </a:fillRef>
+            <a:effectRef idx="0">
+              <a:schemeClr val="dk1"/>
+            </a:effectRef>
+            <a:fontRef idx="minor">
+              <a:schemeClr val="dk1"/>
+            </a:fontRef>
+          </p:style>
+          <p:txBody>
+            <a:bodyPr wrap="none" rtlCol="0">
+              <a:spAutoFit/>
+            </a:bodyPr>
+            <a:lstStyle/>
+            <a:p>
+              <a:r>
+                <a:rPr lang="en-US" sz="1200" dirty="0" smtClean="0"/>
+                <a:t>Dropping of weights state</a:t>
+              </a:r>
+            </a:p>
+            <a:p>
+              <a:pPr marL="171450" indent="-171450">
+                <a:buFont typeface="Arial"/>
+                <a:buChar char="•"/>
+              </a:pPr>
+              <a:r>
+                <a:rPr lang="en-US" sz="800" dirty="0" smtClean="0"/>
+                <a:t>Lower magnet assembly</a:t>
+              </a:r>
+            </a:p>
+            <a:p>
+              <a:pPr marL="171450" indent="-171450">
+                <a:buFont typeface="Arial"/>
+                <a:buChar char="•"/>
+              </a:pPr>
+              <a:r>
+                <a:rPr lang="en-US" sz="800" dirty="0" smtClean="0"/>
+                <a:t>Drive to stepper servos</a:t>
+              </a:r>
+            </a:p>
+            <a:p>
+              <a:pPr marL="171450" indent="-171450">
+                <a:buFont typeface="Arial"/>
+                <a:buChar char="•"/>
+              </a:pPr>
+              <a:r>
+                <a:rPr lang="en-US" sz="800" dirty="0" smtClean="0"/>
+                <a:t>Raise magnet assembly</a:t>
+              </a:r>
+              <a:endParaRPr lang="en-US" sz="800" dirty="0"/>
+            </a:p>
+          </p:txBody>
+        </p:sp>
+        <p:cxnSp>
+          <p:nvCxnSpPr>
+            <p:cNvPr id="11" name="Straight Arrow Connector 10"/>
+            <p:cNvCxnSpPr>
+              <a:stCxn id="4" idx="2"/>
+              <a:endCxn id="5" idx="0"/>
+            </p:cNvCxnSpPr>
+            <p:nvPr/>
+          </p:nvCxnSpPr>
+          <p:spPr>
+            <a:xfrm>
+              <a:off x="4387829" y="760103"/>
+              <a:ext cx="0" cy="568015"/>
+            </a:xfrm>
+            <a:prstGeom prst="straightConnector1">
+              <a:avLst/>
+            </a:prstGeom>
+            <a:ln w="19050">
+              <a:tailEnd type="arrow"/>
+            </a:ln>
+          </p:spPr>
+          <p:style>
+            <a:lnRef idx="1">
+              <a:schemeClr val="dk1"/>
+            </a:lnRef>
+            <a:fillRef idx="0">
+              <a:schemeClr val="dk1"/>
+            </a:fillRef>
+            <a:effectRef idx="0">
+              <a:schemeClr val="dk1"/>
+            </a:effectRef>
+            <a:fontRef idx="minor">
+              <a:schemeClr val="tx1"/>
+            </a:fontRef>
+          </p:style>
+        </p:cxnSp>
+        <p:sp>
+          <p:nvSpPr>
+            <p:cNvPr id="15" name="TextBox 14"/>
+            <p:cNvSpPr txBox="1"/>
+            <p:nvPr/>
+          </p:nvSpPr>
+          <p:spPr>
+            <a:xfrm>
+              <a:off x="4347397" y="938066"/>
+              <a:ext cx="1497438" cy="246221"/>
+            </a:xfrm>
+            <a:prstGeom prst="rect">
+              <a:avLst/>
+            </a:prstGeom>
+            <a:noFill/>
+          </p:spPr>
+          <p:txBody>
+            <a:bodyPr wrap="none" rtlCol="0">
+              <a:spAutoFit/>
+            </a:bodyPr>
+            <a:lstStyle/>
+            <a:p>
+              <a:r>
+                <a:rPr lang="en-US" sz="1000" dirty="0" smtClean="0"/>
+                <a:t>Colour of base registered</a:t>
+              </a:r>
+              <a:endParaRPr lang="en-US" sz="1000" dirty="0"/>
+            </a:p>
+          </p:txBody>
+        </p:sp>
+        <p:cxnSp>
+          <p:nvCxnSpPr>
+            <p:cNvPr id="17" name="Straight Arrow Connector 16"/>
+            <p:cNvCxnSpPr>
+              <a:stCxn id="5" idx="2"/>
+              <a:endCxn id="6" idx="0"/>
+            </p:cNvCxnSpPr>
+            <p:nvPr/>
+          </p:nvCxnSpPr>
+          <p:spPr>
+            <a:xfrm>
+              <a:off x="4387829" y="1974449"/>
+              <a:ext cx="0" cy="616323"/>
+            </a:xfrm>
+            <a:prstGeom prst="straightConnector1">
+              <a:avLst/>
+            </a:prstGeom>
+            <a:ln w="19050">
+              <a:tailEnd type="arrow"/>
+            </a:ln>
+          </p:spPr>
+          <p:style>
+            <a:lnRef idx="1">
+              <a:schemeClr val="dk1"/>
+            </a:lnRef>
+            <a:fillRef idx="0">
+              <a:schemeClr val="dk1"/>
+            </a:fillRef>
+            <a:effectRef idx="0">
+              <a:schemeClr val="dk1"/>
+            </a:effectRef>
+            <a:fontRef idx="minor">
+              <a:schemeClr val="tx1"/>
+            </a:fontRef>
+          </p:style>
+        </p:cxnSp>
+        <p:cxnSp>
+          <p:nvCxnSpPr>
+            <p:cNvPr id="19" name="Straight Arrow Connector 18"/>
+            <p:cNvCxnSpPr>
+              <a:stCxn id="6" idx="2"/>
+              <a:endCxn id="7" idx="0"/>
+            </p:cNvCxnSpPr>
+            <p:nvPr/>
+          </p:nvCxnSpPr>
+          <p:spPr>
+            <a:xfrm>
+              <a:off x="4387829" y="2990882"/>
+              <a:ext cx="0" cy="510093"/>
+            </a:xfrm>
+            <a:prstGeom prst="straightConnector1">
+              <a:avLst/>
+            </a:prstGeom>
+            <a:ln w="19050">
+              <a:tailEnd type="arrow"/>
+            </a:ln>
+          </p:spPr>
+          <p:style>
+            <a:lnRef idx="1">
+              <a:schemeClr val="dk1"/>
+            </a:lnRef>
+            <a:fillRef idx="0">
+              <a:schemeClr val="dk1"/>
+            </a:fillRef>
+            <a:effectRef idx="0">
+              <a:schemeClr val="dk1"/>
+            </a:effectRef>
+            <a:fontRef idx="minor">
+              <a:schemeClr val="tx1"/>
+            </a:fontRef>
+          </p:style>
+        </p:cxnSp>
+        <p:cxnSp>
+          <p:nvCxnSpPr>
+            <p:cNvPr id="21" name="Straight Arrow Connector 20"/>
+            <p:cNvCxnSpPr>
+              <a:stCxn id="7" idx="2"/>
+              <a:endCxn id="8" idx="0"/>
+            </p:cNvCxnSpPr>
+            <p:nvPr/>
+          </p:nvCxnSpPr>
+          <p:spPr>
+            <a:xfrm>
+              <a:off x="4387829" y="4270416"/>
+              <a:ext cx="0" cy="638050"/>
+            </a:xfrm>
+            <a:prstGeom prst="straightConnector1">
+              <a:avLst/>
+            </a:prstGeom>
+            <a:ln w="19050">
+              <a:tailEnd type="arrow"/>
+            </a:ln>
+          </p:spPr>
+          <p:style>
+            <a:lnRef idx="1">
+              <a:schemeClr val="dk1"/>
+            </a:lnRef>
+            <a:fillRef idx="0">
+              <a:schemeClr val="dk1"/>
+            </a:fillRef>
+            <a:effectRef idx="0">
+              <a:schemeClr val="dk1"/>
+            </a:effectRef>
+            <a:fontRef idx="minor">
+              <a:schemeClr val="tx1"/>
+            </a:fontRef>
+          </p:style>
+        </p:cxnSp>
+        <p:cxnSp>
+          <p:nvCxnSpPr>
+            <p:cNvPr id="23" name="Straight Arrow Connector 22"/>
+            <p:cNvCxnSpPr>
+              <a:stCxn id="8" idx="2"/>
+              <a:endCxn id="9" idx="0"/>
+            </p:cNvCxnSpPr>
+            <p:nvPr/>
+          </p:nvCxnSpPr>
+          <p:spPr>
+            <a:xfrm>
+              <a:off x="4387829" y="5431686"/>
+              <a:ext cx="12972" cy="484992"/>
+            </a:xfrm>
+            <a:prstGeom prst="straightConnector1">
+              <a:avLst/>
+            </a:prstGeom>
+            <a:ln w="19050">
+              <a:tailEnd type="arrow"/>
+            </a:ln>
+          </p:spPr>
+          <p:style>
+            <a:lnRef idx="1">
+              <a:schemeClr val="dk1"/>
+            </a:lnRef>
+            <a:fillRef idx="0">
+              <a:schemeClr val="dk1"/>
+            </a:fillRef>
+            <a:effectRef idx="0">
+              <a:schemeClr val="dk1"/>
+            </a:effectRef>
+            <a:fontRef idx="minor">
+              <a:schemeClr val="tx1"/>
+            </a:fontRef>
+          </p:style>
+        </p:cxnSp>
+        <p:sp>
+          <p:nvSpPr>
+            <p:cNvPr id="37" name="TextBox 36"/>
+            <p:cNvSpPr txBox="1"/>
+            <p:nvPr/>
+          </p:nvSpPr>
+          <p:spPr>
+            <a:xfrm>
+              <a:off x="4387829" y="2187534"/>
+              <a:ext cx="913218" cy="246221"/>
+            </a:xfrm>
+            <a:prstGeom prst="rect">
+              <a:avLst/>
+            </a:prstGeom>
+            <a:noFill/>
+          </p:spPr>
+          <p:txBody>
+            <a:bodyPr wrap="none" rtlCol="0">
+              <a:spAutoFit/>
+            </a:bodyPr>
+            <a:lstStyle/>
+            <a:p>
+              <a:r>
+                <a:rPr lang="en-US" sz="1000" dirty="0" smtClean="0"/>
+                <a:t>Locate weight</a:t>
+              </a:r>
+              <a:endParaRPr lang="en-US" sz="1000" dirty="0"/>
+            </a:p>
+          </p:txBody>
+        </p:sp>
+        <p:sp>
+          <p:nvSpPr>
+            <p:cNvPr id="38" name="TextBox 37"/>
+            <p:cNvSpPr txBox="1"/>
+            <p:nvPr/>
+          </p:nvSpPr>
+          <p:spPr>
+            <a:xfrm>
+              <a:off x="4387829" y="3158744"/>
+              <a:ext cx="1455609" cy="246221"/>
+            </a:xfrm>
+            <a:prstGeom prst="rect">
+              <a:avLst/>
+            </a:prstGeom>
+            <a:noFill/>
+          </p:spPr>
+          <p:txBody>
+            <a:bodyPr wrap="none" rtlCol="0">
+              <a:spAutoFit/>
+            </a:bodyPr>
+            <a:lstStyle/>
+            <a:p>
+              <a:r>
+                <a:rPr lang="en-US" sz="1000" dirty="0" smtClean="0"/>
+                <a:t>Aligned to attach weight</a:t>
+              </a:r>
+              <a:endParaRPr lang="en-US" sz="1000" dirty="0"/>
+            </a:p>
+          </p:txBody>
+        </p:sp>
+        <p:sp>
+          <p:nvSpPr>
+            <p:cNvPr id="39" name="TextBox 38"/>
+            <p:cNvSpPr txBox="1"/>
+            <p:nvPr/>
+          </p:nvSpPr>
+          <p:spPr>
+            <a:xfrm>
+              <a:off x="4341961" y="4503495"/>
+              <a:ext cx="1407582" cy="246221"/>
+            </a:xfrm>
+            <a:prstGeom prst="rect">
+              <a:avLst/>
+            </a:prstGeom>
+            <a:noFill/>
+          </p:spPr>
+          <p:txBody>
+            <a:bodyPr wrap="none" rtlCol="0">
+              <a:spAutoFit/>
+            </a:bodyPr>
+            <a:lstStyle/>
+            <a:p>
+              <a:r>
+                <a:rPr lang="en-US" sz="1000" dirty="0" smtClean="0"/>
+                <a:t>Three weights attached</a:t>
+              </a:r>
+              <a:endParaRPr lang="en-US" sz="1000" dirty="0"/>
+            </a:p>
+          </p:txBody>
+        </p:sp>
+        <p:sp>
+          <p:nvSpPr>
+            <p:cNvPr id="40" name="TextBox 39"/>
+            <p:cNvSpPr txBox="1"/>
+            <p:nvPr/>
+          </p:nvSpPr>
+          <p:spPr>
+            <a:xfrm>
+              <a:off x="4363273" y="5612793"/>
+              <a:ext cx="1535697" cy="246221"/>
+            </a:xfrm>
+            <a:prstGeom prst="rect">
+              <a:avLst/>
+            </a:prstGeom>
+            <a:noFill/>
+          </p:spPr>
+          <p:txBody>
+            <a:bodyPr wrap="none" rtlCol="0">
+              <a:spAutoFit/>
+            </a:bodyPr>
+            <a:lstStyle/>
+            <a:p>
+              <a:r>
+                <a:rPr lang="en-US" sz="1000" dirty="0" smtClean="0"/>
+                <a:t>Colour of base recognized</a:t>
+              </a:r>
+              <a:endParaRPr lang="en-US" sz="1000" dirty="0"/>
+            </a:p>
+          </p:txBody>
+        </p:sp>
+        <p:cxnSp>
+          <p:nvCxnSpPr>
+            <p:cNvPr id="63" name="Elbow Connector 62"/>
+            <p:cNvCxnSpPr>
+              <a:stCxn id="7" idx="1"/>
+              <a:endCxn id="5" idx="1"/>
+            </p:cNvCxnSpPr>
+            <p:nvPr/>
+          </p:nvCxnSpPr>
+          <p:spPr>
+            <a:xfrm rot="10800000" flipH="1">
+              <a:off x="3346517" y="1651284"/>
+              <a:ext cx="294953" cy="2234412"/>
+            </a:xfrm>
+            <a:prstGeom prst="bentConnector3">
+              <a:avLst>
+                <a:gd name="adj1" fmla="val -441576"/>
+              </a:avLst>
+            </a:prstGeom>
+            <a:ln w="19050">
+              <a:tailEnd type="arrow"/>
+            </a:ln>
+          </p:spPr>
+          <p:style>
+            <a:lnRef idx="1">
+              <a:schemeClr val="dk1"/>
+            </a:lnRef>
+            <a:fillRef idx="0">
+              <a:schemeClr val="dk1"/>
+            </a:fillRef>
+            <a:effectRef idx="0">
+              <a:schemeClr val="dk1"/>
+            </a:effectRef>
+            <a:fontRef idx="minor">
+              <a:schemeClr val="tx1"/>
+            </a:fontRef>
+          </p:style>
+        </p:cxnSp>
+        <p:cxnSp>
+          <p:nvCxnSpPr>
+            <p:cNvPr id="69" name="Elbow Connector 68"/>
+            <p:cNvCxnSpPr>
+              <a:stCxn id="9" idx="3"/>
+              <a:endCxn id="5" idx="3"/>
+            </p:cNvCxnSpPr>
+            <p:nvPr/>
+          </p:nvCxnSpPr>
+          <p:spPr>
+            <a:xfrm flipH="1" flipV="1">
+              <a:off x="5134187" y="1651284"/>
+              <a:ext cx="166860" cy="4588560"/>
+            </a:xfrm>
+            <a:prstGeom prst="bentConnector3">
+              <a:avLst>
+                <a:gd name="adj1" fmla="val -830925"/>
+              </a:avLst>
+            </a:prstGeom>
+            <a:ln w="19050">
+              <a:tailEnd type="arrow"/>
+            </a:ln>
+          </p:spPr>
+          <p:style>
+            <a:lnRef idx="1">
+              <a:schemeClr val="dk1"/>
+            </a:lnRef>
+            <a:fillRef idx="0">
+              <a:schemeClr val="dk1"/>
+            </a:fillRef>
+            <a:effectRef idx="0">
+              <a:schemeClr val="dk1"/>
+            </a:effectRef>
+            <a:fontRef idx="minor">
+              <a:schemeClr val="tx1"/>
+            </a:fontRef>
+          </p:style>
+        </p:cxnSp>
+        <p:sp>
+          <p:nvSpPr>
+            <p:cNvPr id="82" name="TextBox 81"/>
+            <p:cNvSpPr txBox="1"/>
+            <p:nvPr/>
+          </p:nvSpPr>
+          <p:spPr>
+            <a:xfrm>
+              <a:off x="1534065" y="3885697"/>
+              <a:ext cx="1703449" cy="400110"/>
+            </a:xfrm>
+            <a:prstGeom prst="rect">
+              <a:avLst/>
+            </a:prstGeom>
+            <a:noFill/>
+          </p:spPr>
+          <p:txBody>
+            <a:bodyPr wrap="none" rtlCol="0">
+              <a:spAutoFit/>
+            </a:bodyPr>
+            <a:lstStyle/>
+            <a:p>
+              <a:r>
+                <a:rPr lang="en-US" sz="1000" dirty="0" smtClean="0"/>
+                <a:t>Less then 3 weights on board</a:t>
+              </a:r>
+            </a:p>
+            <a:p>
+              <a:r>
+                <a:rPr lang="en-US" sz="1000" dirty="0" smtClean="0"/>
+                <a:t>OR weight was not picked up</a:t>
+              </a:r>
+              <a:endParaRPr lang="en-US" sz="1000" dirty="0"/>
+            </a:p>
+          </p:txBody>
+        </p:sp>
+        <p:sp>
+          <p:nvSpPr>
+            <p:cNvPr id="87" name="TextBox 86"/>
+            <p:cNvSpPr txBox="1"/>
+            <p:nvPr/>
+          </p:nvSpPr>
+          <p:spPr>
+            <a:xfrm>
+              <a:off x="5538144" y="6232726"/>
+              <a:ext cx="1130187" cy="246221"/>
+            </a:xfrm>
+            <a:prstGeom prst="rect">
+              <a:avLst/>
+            </a:prstGeom>
+            <a:noFill/>
+          </p:spPr>
+          <p:txBody>
+            <a:bodyPr wrap="none" rtlCol="0">
+              <a:spAutoFit/>
+            </a:bodyPr>
+            <a:lstStyle/>
+            <a:p>
+              <a:r>
+                <a:rPr lang="en-US" sz="1000" dirty="0" smtClean="0"/>
+                <a:t>Weights detached</a:t>
+              </a:r>
+              <a:endParaRPr lang="en-US" sz="1000" dirty="0"/>
+            </a:p>
+          </p:txBody>
+        </p:sp>
+        <p:cxnSp>
+          <p:nvCxnSpPr>
+            <p:cNvPr id="89" name="Elbow Connector 88"/>
+            <p:cNvCxnSpPr>
+              <a:stCxn id="9" idx="2"/>
+              <a:endCxn id="9" idx="1"/>
+            </p:cNvCxnSpPr>
+            <p:nvPr/>
+          </p:nvCxnSpPr>
+          <p:spPr>
+            <a:xfrm rot="5400000" flipH="1">
+              <a:off x="3789095" y="5951304"/>
+              <a:ext cx="323165" cy="900247"/>
+            </a:xfrm>
+            <a:prstGeom prst="bentConnector4">
+              <a:avLst>
+                <a:gd name="adj1" fmla="val -47620"/>
+                <a:gd name="adj2" fmla="val 125393"/>
+              </a:avLst>
+            </a:prstGeom>
+            <a:ln w="19050">
+              <a:tailEnd type="arrow"/>
+            </a:ln>
+          </p:spPr>
+          <p:style>
+            <a:lnRef idx="1">
+              <a:schemeClr val="dk1"/>
+            </a:lnRef>
+            <a:fillRef idx="0">
+              <a:schemeClr val="dk1"/>
+            </a:fillRef>
+            <a:effectRef idx="0">
+              <a:schemeClr val="dk1"/>
+            </a:effectRef>
+            <a:fontRef idx="minor">
+              <a:schemeClr val="tx1"/>
+            </a:fontRef>
+          </p:style>
+        </p:cxnSp>
+        <p:sp>
+          <p:nvSpPr>
+            <p:cNvPr id="92" name="TextBox 91"/>
+            <p:cNvSpPr txBox="1"/>
+            <p:nvPr/>
+          </p:nvSpPr>
+          <p:spPr>
+            <a:xfrm>
+              <a:off x="1629870" y="6355836"/>
+              <a:ext cx="1607644" cy="246221"/>
+            </a:xfrm>
+            <a:prstGeom prst="rect">
+              <a:avLst/>
+            </a:prstGeom>
+            <a:noFill/>
+          </p:spPr>
+          <p:txBody>
+            <a:bodyPr wrap="none" rtlCol="0">
+              <a:spAutoFit/>
+            </a:bodyPr>
+            <a:lstStyle/>
+            <a:p>
+              <a:r>
+                <a:rPr lang="en-US" sz="1000" dirty="0" smtClean="0"/>
+                <a:t>Some weights still attached</a:t>
+              </a:r>
+              <a:endParaRPr lang="en-US" sz="1000" dirty="0"/>
+            </a:p>
+          </p:txBody>
+        </p:sp>
+      </p:grpSp>
     </p:spTree>
     <p:extLst>
       <p:ext uri="{BB962C8B-B14F-4D97-AF65-F5344CB8AC3E}">
@@ -4253,7 +4093,7 @@
   <p:timing>
     <p:tnLst>
       <p:par>
-        <p:cTn xmlns:p14="http://schemas.microsoft.com/office/powerpoint/2010/main" id="1" dur="indefinite" restart="never" nodeType="tmRoot"/>
+        <p:cTn id="1" dur="indefinite" restart="never" nodeType="tmRoot"/>
       </p:par>
     </p:tnLst>
   </p:timing>
@@ -4328,7 +4168,7 @@
   <p:timing>
     <p:tnLst>
       <p:par>
-        <p:cTn xmlns:p14="http://schemas.microsoft.com/office/powerpoint/2010/main" id="1" dur="indefinite" restart="never" nodeType="tmRoot"/>
+        <p:cTn id="1" dur="indefinite" restart="never" nodeType="tmRoot"/>
       </p:par>
     </p:tnLst>
   </p:timing>

</xml_diff>